<commit_message>
shortened presentation format update
</commit_message>
<xml_diff>
--- a/Automated Project Cost Prediction Engine (cathy).pptx
+++ b/Automated Project Cost Prediction Engine (cathy).pptx
@@ -6632,11 +6632,7 @@
           <a:p>
             <a:r>
               <a:rPr lang="en-US" dirty="0" smtClean="0"/>
-              <a:t>Centralized Database &amp; Automated </a:t>
-            </a:r>
-            <a:r>
-              <a:rPr lang="en-US" dirty="0" smtClean="0"/>
-              <a:t>Project Cost Prediction Engine</a:t>
+              <a:t>Centralized Database &amp; Automated Project Cost Prediction Engine</a:t>
             </a:r>
             <a:endParaRPr lang="en-US" dirty="0"/>
           </a:p>
@@ -8432,11 +8428,7 @@
           <a:p>
             <a:r>
               <a:rPr lang="en-US" dirty="0" smtClean="0"/>
-              <a:t>These implementations will enable us to speed up internal negotiations on pricing and free up time for the rest of the business to focus on maximizing the quality of their deliverables</a:t>
-            </a:r>
-            <a:r>
-              <a:rPr lang="en-US" dirty="0" smtClean="0"/>
-              <a:t>.</a:t>
+              <a:t>These implementations will enable us to speed up internal negotiations on pricing and free up time for the rest of the business to focus on maximizing the quality of their deliverables.</a:t>
             </a:r>
           </a:p>
           <a:p>
@@ -8472,7 +8464,6 @@
               <a:rPr lang="en-US" dirty="0" smtClean="0"/>
               <a:t>Continue to work on predictive model</a:t>
             </a:r>
-            <a:endParaRPr lang="en-US" dirty="0" smtClean="0"/>
           </a:p>
           <a:p>
             <a:pPr lvl="1"/>
@@ -9410,13 +9401,8 @@
           <a:p>
             <a:r>
               <a:rPr lang="en-US" dirty="0" smtClean="0"/>
-              <a:t>Westfield’s appetite for financial recommendations validated by historical data is increasing</a:t>
-            </a:r>
-            <a:r>
-              <a:rPr lang="en-US" dirty="0" smtClean="0"/>
-              <a:t>.</a:t>
-            </a:r>
-            <a:endParaRPr lang="en-US" dirty="0" smtClean="0"/>
+              <a:t>Westfield’s appetite for financial recommendations validated by historical data is increasing.</a:t>
+            </a:r>
           </a:p>
         </p:txBody>
       </p:sp>
@@ -9672,19 +9658,7 @@
           <a:p>
             <a:r>
               <a:rPr lang="en-US" dirty="0" smtClean="0"/>
-              <a:t>Development finance is not able to fully leverage our historical data </a:t>
-            </a:r>
-            <a:r>
-              <a:rPr lang="en-US" dirty="0" smtClean="0"/>
-              <a:t>efficiently and maximize </a:t>
-            </a:r>
-            <a:r>
-              <a:rPr lang="en-US" dirty="0" smtClean="0"/>
-              <a:t>potential</a:t>
-            </a:r>
-            <a:r>
-              <a:rPr lang="en-US" dirty="0" smtClean="0"/>
-              <a:t>.</a:t>
+              <a:t>Development finance is not able to fully leverage our historical data efficiently and maximize potential.</a:t>
             </a:r>
           </a:p>
           <a:p>
@@ -10408,11 +10382,7 @@
             </a:r>
             <a:r>
               <a:rPr lang="en-US" dirty="0" smtClean="0"/>
-              <a:t>create a centralized point for all of our project data</a:t>
-            </a:r>
-            <a:r>
-              <a:rPr lang="en-US" dirty="0" smtClean="0"/>
-              <a:t>.</a:t>
+              <a:t>create a centralized point for all of our project data.</a:t>
             </a:r>
             <a:endParaRPr lang="en-US" dirty="0"/>
           </a:p>
@@ -11801,11 +11771,7 @@
           <a:p>
             <a:r>
               <a:rPr lang="en-US" dirty="0" smtClean="0"/>
-              <a:t>Action #1 – Create </a:t>
-            </a:r>
-            <a:r>
-              <a:rPr lang="en-US" dirty="0" smtClean="0"/>
-              <a:t>Database </a:t>
+              <a:t>Action #1 – Create Database </a:t>
             </a:r>
             <a:endParaRPr lang="en-US" dirty="0"/>
           </a:p>
@@ -12396,11 +12362,7 @@
           <a:p>
             <a:r>
               <a:rPr lang="en-US" dirty="0" smtClean="0"/>
-              <a:t>Time of personnel from IT &amp; Dev. Finance to </a:t>
-            </a:r>
-            <a:r>
-              <a:rPr lang="en-US" dirty="0" smtClean="0"/>
-              <a:t>determine format and layout of data</a:t>
+              <a:t>Time of personnel from IT &amp; Dev. Finance to determine format and layout of data</a:t>
             </a:r>
             <a:endParaRPr lang="en-US" dirty="0"/>
           </a:p>

</xml_diff>